<commit_message>
little fixes to the presentation
</commit_message>
<xml_diff>
--- a/slides/Slides.pptx
+++ b/slides/Slides.pptx
@@ -272,7 +272,7 @@
           <a:p>
             <a:fld id="{0DAF61AA-5A98-4049-A93E-477E5505141A}" type="datetimeFigureOut">
               <a:rPr lang="en-US" smtClean="0"/>
-              <a:t>12/7/2020</a:t>
+              <a:t>12/11/2020</a:t>
             </a:fld>
             <a:endParaRPr lang="en-US" dirty="0"/>
           </a:p>
@@ -342,13 +342,13 @@
   <p:clrMapOvr>
     <a:masterClrMapping/>
   </p:clrMapOvr>
-  <mc:AlternateContent xmlns:mc="http://schemas.openxmlformats.org/markup-compatibility/2006" xmlns:p15="http://schemas.microsoft.com/office/powerpoint/2012/main">
-    <mc:Choice Requires="p15">
+  <mc:AlternateContent xmlns:mc="http://schemas.openxmlformats.org/markup-compatibility/2006">
+    <mc:Choice xmlns:p15="http://schemas.microsoft.com/office/powerpoint/2012/main" Requires="p15">
       <p:transition xmlns:p14="http://schemas.microsoft.com/office/powerpoint/2010/main" spd="slow" p14:dur="1250">
-        <p15:prstTrans prst="airplane"/>
+        <p15:prstTrans prst="pageCurlDouble"/>
       </p:transition>
     </mc:Choice>
-    <mc:Fallback xmlns="">
+    <mc:Fallback>
       <p:transition spd="slow">
         <p:fade/>
       </p:transition>
@@ -482,7 +482,7 @@
           <a:p>
             <a:fld id="{0DAF61AA-5A98-4049-A93E-477E5505141A}" type="datetimeFigureOut">
               <a:rPr lang="en-US" smtClean="0"/>
-              <a:t>12/7/2020</a:t>
+              <a:t>12/11/2020</a:t>
             </a:fld>
             <a:endParaRPr lang="en-US"/>
           </a:p>
@@ -552,13 +552,13 @@
   <p:clrMapOvr>
     <a:masterClrMapping/>
   </p:clrMapOvr>
-  <mc:AlternateContent xmlns:mc="http://schemas.openxmlformats.org/markup-compatibility/2006" xmlns:p15="http://schemas.microsoft.com/office/powerpoint/2012/main">
-    <mc:Choice Requires="p15">
+  <mc:AlternateContent xmlns:mc="http://schemas.openxmlformats.org/markup-compatibility/2006">
+    <mc:Choice xmlns:p15="http://schemas.microsoft.com/office/powerpoint/2012/main" Requires="p15">
       <p:transition xmlns:p14="http://schemas.microsoft.com/office/powerpoint/2010/main" spd="slow" p14:dur="1250">
-        <p15:prstTrans prst="airplane"/>
+        <p15:prstTrans prst="pageCurlDouble"/>
       </p:transition>
     </mc:Choice>
-    <mc:Fallback xmlns="">
+    <mc:Fallback>
       <p:transition spd="slow">
         <p:fade/>
       </p:transition>
@@ -702,7 +702,7 @@
           <a:p>
             <a:fld id="{0DAF61AA-5A98-4049-A93E-477E5505141A}" type="datetimeFigureOut">
               <a:rPr lang="en-US" smtClean="0"/>
-              <a:t>12/7/2020</a:t>
+              <a:t>12/11/2020</a:t>
             </a:fld>
             <a:endParaRPr lang="en-US"/>
           </a:p>
@@ -772,13 +772,13 @@
   <p:clrMapOvr>
     <a:masterClrMapping/>
   </p:clrMapOvr>
-  <mc:AlternateContent xmlns:mc="http://schemas.openxmlformats.org/markup-compatibility/2006" xmlns:p15="http://schemas.microsoft.com/office/powerpoint/2012/main">
-    <mc:Choice Requires="p15">
+  <mc:AlternateContent xmlns:mc="http://schemas.openxmlformats.org/markup-compatibility/2006">
+    <mc:Choice xmlns:p15="http://schemas.microsoft.com/office/powerpoint/2012/main" Requires="p15">
       <p:transition xmlns:p14="http://schemas.microsoft.com/office/powerpoint/2010/main" spd="slow" p14:dur="1250">
-        <p15:prstTrans prst="airplane"/>
+        <p15:prstTrans prst="pageCurlDouble"/>
       </p:transition>
     </mc:Choice>
-    <mc:Fallback xmlns="">
+    <mc:Fallback>
       <p:transition spd="slow">
         <p:fade/>
       </p:transition>
@@ -912,7 +912,7 @@
           <a:p>
             <a:fld id="{0DAF61AA-5A98-4049-A93E-477E5505141A}" type="datetimeFigureOut">
               <a:rPr lang="en-US" smtClean="0"/>
-              <a:t>12/7/2020</a:t>
+              <a:t>12/11/2020</a:t>
             </a:fld>
             <a:endParaRPr lang="en-US"/>
           </a:p>
@@ -982,13 +982,13 @@
   <p:clrMapOvr>
     <a:masterClrMapping/>
   </p:clrMapOvr>
-  <mc:AlternateContent xmlns:mc="http://schemas.openxmlformats.org/markup-compatibility/2006" xmlns:p15="http://schemas.microsoft.com/office/powerpoint/2012/main">
-    <mc:Choice Requires="p15">
+  <mc:AlternateContent xmlns:mc="http://schemas.openxmlformats.org/markup-compatibility/2006">
+    <mc:Choice xmlns:p15="http://schemas.microsoft.com/office/powerpoint/2012/main" Requires="p15">
       <p:transition xmlns:p14="http://schemas.microsoft.com/office/powerpoint/2010/main" spd="slow" p14:dur="1250">
-        <p15:prstTrans prst="airplane"/>
+        <p15:prstTrans prst="pageCurlDouble"/>
       </p:transition>
     </mc:Choice>
-    <mc:Fallback xmlns="">
+    <mc:Fallback>
       <p:transition spd="slow">
         <p:fade/>
       </p:transition>
@@ -1199,7 +1199,7 @@
           <a:p>
             <a:fld id="{0DAF61AA-5A98-4049-A93E-477E5505141A}" type="datetimeFigureOut">
               <a:rPr lang="en-US" smtClean="0"/>
-              <a:t>12/7/2020</a:t>
+              <a:t>12/11/2020</a:t>
             </a:fld>
             <a:endParaRPr lang="en-US"/>
           </a:p>
@@ -1269,13 +1269,13 @@
   <p:clrMapOvr>
     <a:masterClrMapping/>
   </p:clrMapOvr>
-  <mc:AlternateContent xmlns:mc="http://schemas.openxmlformats.org/markup-compatibility/2006" xmlns:p15="http://schemas.microsoft.com/office/powerpoint/2012/main">
-    <mc:Choice Requires="p15">
+  <mc:AlternateContent xmlns:mc="http://schemas.openxmlformats.org/markup-compatibility/2006">
+    <mc:Choice xmlns:p15="http://schemas.microsoft.com/office/powerpoint/2012/main" Requires="p15">
       <p:transition xmlns:p14="http://schemas.microsoft.com/office/powerpoint/2010/main" spd="slow" p14:dur="1250">
-        <p15:prstTrans prst="airplane"/>
+        <p15:prstTrans prst="pageCurlDouble"/>
       </p:transition>
     </mc:Choice>
-    <mc:Fallback xmlns="">
+    <mc:Fallback>
       <p:transition spd="slow">
         <p:fade/>
       </p:transition>
@@ -1476,7 +1476,7 @@
           <a:p>
             <a:fld id="{0DAF61AA-5A98-4049-A93E-477E5505141A}" type="datetimeFigureOut">
               <a:rPr lang="en-US" smtClean="0"/>
-              <a:t>12/7/2020</a:t>
+              <a:t>12/11/2020</a:t>
             </a:fld>
             <a:endParaRPr lang="en-US"/>
           </a:p>
@@ -1546,13 +1546,13 @@
   <p:clrMapOvr>
     <a:masterClrMapping/>
   </p:clrMapOvr>
-  <mc:AlternateContent xmlns:mc="http://schemas.openxmlformats.org/markup-compatibility/2006" xmlns:p15="http://schemas.microsoft.com/office/powerpoint/2012/main">
-    <mc:Choice Requires="p15">
+  <mc:AlternateContent xmlns:mc="http://schemas.openxmlformats.org/markup-compatibility/2006">
+    <mc:Choice xmlns:p15="http://schemas.microsoft.com/office/powerpoint/2012/main" Requires="p15">
       <p:transition xmlns:p14="http://schemas.microsoft.com/office/powerpoint/2010/main" spd="slow" p14:dur="1250">
-        <p15:prstTrans prst="airplane"/>
+        <p15:prstTrans prst="pageCurlDouble"/>
       </p:transition>
     </mc:Choice>
-    <mc:Fallback xmlns="">
+    <mc:Fallback>
       <p:transition spd="slow">
         <p:fade/>
       </p:transition>
@@ -1900,7 +1900,7 @@
           <a:p>
             <a:fld id="{0DAF61AA-5A98-4049-A93E-477E5505141A}" type="datetimeFigureOut">
               <a:rPr lang="en-US" smtClean="0"/>
-              <a:t>12/7/2020</a:t>
+              <a:t>12/11/2020</a:t>
             </a:fld>
             <a:endParaRPr lang="en-US"/>
           </a:p>
@@ -1970,13 +1970,13 @@
   <p:clrMapOvr>
     <a:masterClrMapping/>
   </p:clrMapOvr>
-  <mc:AlternateContent xmlns:mc="http://schemas.openxmlformats.org/markup-compatibility/2006" xmlns:p15="http://schemas.microsoft.com/office/powerpoint/2012/main">
-    <mc:Choice Requires="p15">
+  <mc:AlternateContent xmlns:mc="http://schemas.openxmlformats.org/markup-compatibility/2006">
+    <mc:Choice xmlns:p15="http://schemas.microsoft.com/office/powerpoint/2012/main" Requires="p15">
       <p:transition xmlns:p14="http://schemas.microsoft.com/office/powerpoint/2010/main" spd="slow" p14:dur="1250">
-        <p15:prstTrans prst="airplane"/>
+        <p15:prstTrans prst="pageCurlDouble"/>
       </p:transition>
     </mc:Choice>
-    <mc:Fallback xmlns="">
+    <mc:Fallback>
       <p:transition spd="slow">
         <p:fade/>
       </p:transition>
@@ -2053,7 +2053,7 @@
           <a:p>
             <a:fld id="{0DAF61AA-5A98-4049-A93E-477E5505141A}" type="datetimeFigureOut">
               <a:rPr lang="en-US" smtClean="0"/>
-              <a:t>12/7/2020</a:t>
+              <a:t>12/11/2020</a:t>
             </a:fld>
             <a:endParaRPr lang="en-US"/>
           </a:p>
@@ -2123,13 +2123,13 @@
   <p:clrMapOvr>
     <a:masterClrMapping/>
   </p:clrMapOvr>
-  <mc:AlternateContent xmlns:mc="http://schemas.openxmlformats.org/markup-compatibility/2006" xmlns:p15="http://schemas.microsoft.com/office/powerpoint/2012/main">
-    <mc:Choice Requires="p15">
+  <mc:AlternateContent xmlns:mc="http://schemas.openxmlformats.org/markup-compatibility/2006">
+    <mc:Choice xmlns:p15="http://schemas.microsoft.com/office/powerpoint/2012/main" Requires="p15">
       <p:transition xmlns:p14="http://schemas.microsoft.com/office/powerpoint/2010/main" spd="slow" p14:dur="1250">
-        <p15:prstTrans prst="airplane"/>
+        <p15:prstTrans prst="pageCurlDouble"/>
       </p:transition>
     </mc:Choice>
-    <mc:Fallback xmlns="">
+    <mc:Fallback>
       <p:transition spd="slow">
         <p:fade/>
       </p:transition>
@@ -2178,7 +2178,7 @@
           <a:p>
             <a:fld id="{0DAF61AA-5A98-4049-A93E-477E5505141A}" type="datetimeFigureOut">
               <a:rPr lang="en-US" smtClean="0"/>
-              <a:t>12/7/2020</a:t>
+              <a:t>12/11/2020</a:t>
             </a:fld>
             <a:endParaRPr lang="en-US"/>
           </a:p>
@@ -2248,13 +2248,13 @@
   <p:clrMapOvr>
     <a:masterClrMapping/>
   </p:clrMapOvr>
-  <mc:AlternateContent xmlns:mc="http://schemas.openxmlformats.org/markup-compatibility/2006" xmlns:p15="http://schemas.microsoft.com/office/powerpoint/2012/main">
-    <mc:Choice Requires="p15">
+  <mc:AlternateContent xmlns:mc="http://schemas.openxmlformats.org/markup-compatibility/2006">
+    <mc:Choice xmlns:p15="http://schemas.microsoft.com/office/powerpoint/2012/main" Requires="p15">
       <p:transition xmlns:p14="http://schemas.microsoft.com/office/powerpoint/2010/main" spd="slow" p14:dur="1250">
-        <p15:prstTrans prst="airplane"/>
+        <p15:prstTrans prst="pageCurlDouble"/>
       </p:transition>
     </mc:Choice>
-    <mc:Fallback xmlns="">
+    <mc:Fallback>
       <p:transition spd="slow">
         <p:fade/>
       </p:transition>
@@ -2501,7 +2501,7 @@
           <a:p>
             <a:fld id="{0DAF61AA-5A98-4049-A93E-477E5505141A}" type="datetimeFigureOut">
               <a:rPr lang="en-US" smtClean="0"/>
-              <a:t>12/7/2020</a:t>
+              <a:t>12/11/2020</a:t>
             </a:fld>
             <a:endParaRPr lang="en-US"/>
           </a:p>
@@ -2571,13 +2571,13 @@
   <p:clrMapOvr>
     <a:masterClrMapping/>
   </p:clrMapOvr>
-  <mc:AlternateContent xmlns:mc="http://schemas.openxmlformats.org/markup-compatibility/2006" xmlns:p15="http://schemas.microsoft.com/office/powerpoint/2012/main">
-    <mc:Choice Requires="p15">
+  <mc:AlternateContent xmlns:mc="http://schemas.openxmlformats.org/markup-compatibility/2006">
+    <mc:Choice xmlns:p15="http://schemas.microsoft.com/office/powerpoint/2012/main" Requires="p15">
       <p:transition xmlns:p14="http://schemas.microsoft.com/office/powerpoint/2010/main" spd="slow" p14:dur="1250">
-        <p15:prstTrans prst="airplane"/>
+        <p15:prstTrans prst="pageCurlDouble"/>
       </p:transition>
     </mc:Choice>
-    <mc:Fallback xmlns="">
+    <mc:Fallback>
       <p:transition spd="slow">
         <p:fade/>
       </p:transition>
@@ -2804,7 +2804,7 @@
           <a:p>
             <a:fld id="{0DAF61AA-5A98-4049-A93E-477E5505141A}" type="datetimeFigureOut">
               <a:rPr lang="en-US" smtClean="0"/>
-              <a:t>12/7/2020</a:t>
+              <a:t>12/11/2020</a:t>
             </a:fld>
             <a:endParaRPr lang="en-US"/>
           </a:p>
@@ -2874,13 +2874,13 @@
   <p:clrMapOvr>
     <a:masterClrMapping/>
   </p:clrMapOvr>
-  <mc:AlternateContent xmlns:mc="http://schemas.openxmlformats.org/markup-compatibility/2006" xmlns:p15="http://schemas.microsoft.com/office/powerpoint/2012/main">
-    <mc:Choice Requires="p15">
+  <mc:AlternateContent xmlns:mc="http://schemas.openxmlformats.org/markup-compatibility/2006">
+    <mc:Choice xmlns:p15="http://schemas.microsoft.com/office/powerpoint/2012/main" Requires="p15">
       <p:transition xmlns:p14="http://schemas.microsoft.com/office/powerpoint/2010/main" spd="slow" p14:dur="1250">
-        <p15:prstTrans prst="airplane"/>
+        <p15:prstTrans prst="pageCurlDouble"/>
       </p:transition>
     </mc:Choice>
-    <mc:Fallback xmlns="">
+    <mc:Fallback>
       <p:transition spd="slow">
         <p:fade/>
       </p:transition>
@@ -6504,7 +6504,7 @@
             <a:fld id="{0DAF61AA-5A98-4049-A93E-477E5505141A}" type="datetimeFigureOut">
               <a:rPr lang="en-US" smtClean="0"/>
               <a:pPr/>
-              <a:t>12/7/2020</a:t>
+              <a:t>12/11/2020</a:t>
             </a:fld>
             <a:endParaRPr lang="en-US" dirty="0"/>
           </a:p>
@@ -6624,13 +6624,13 @@
     <p:sldLayoutId id="2147483677" r:id="rId10"/>
     <p:sldLayoutId id="2147483679" r:id="rId11"/>
   </p:sldLayoutIdLst>
-  <mc:AlternateContent xmlns:mc="http://schemas.openxmlformats.org/markup-compatibility/2006" xmlns:p15="http://schemas.microsoft.com/office/powerpoint/2012/main">
-    <mc:Choice Requires="p15">
+  <mc:AlternateContent xmlns:mc="http://schemas.openxmlformats.org/markup-compatibility/2006">
+    <mc:Choice xmlns:p15="http://schemas.microsoft.com/office/powerpoint/2012/main" Requires="p15">
       <p:transition xmlns:p14="http://schemas.microsoft.com/office/powerpoint/2010/main" spd="slow" p14:dur="1250">
-        <p15:prstTrans prst="airplane"/>
+        <p15:prstTrans prst="pageCurlDouble"/>
       </p:transition>
     </mc:Choice>
-    <mc:Fallback xmlns="">
+    <mc:Fallback>
       <p:transition spd="slow">
         <p:fade/>
       </p:transition>
@@ -10806,13 +10806,13 @@
   <p:clrMapOvr>
     <a:masterClrMapping/>
   </p:clrMapOvr>
-  <mc:AlternateContent xmlns:mc="http://schemas.openxmlformats.org/markup-compatibility/2006" xmlns:p15="http://schemas.microsoft.com/office/powerpoint/2012/main">
-    <mc:Choice Requires="p15">
+  <mc:AlternateContent xmlns:mc="http://schemas.openxmlformats.org/markup-compatibility/2006">
+    <mc:Choice xmlns:p15="http://schemas.microsoft.com/office/powerpoint/2012/main" Requires="p15">
       <p:transition xmlns:p14="http://schemas.microsoft.com/office/powerpoint/2010/main" spd="slow" p14:dur="1250">
-        <p15:prstTrans prst="airplane"/>
+        <p15:prstTrans prst="pageCurlDouble"/>
       </p:transition>
     </mc:Choice>
-    <mc:Fallback xmlns="">
+    <mc:Fallback>
       <p:transition spd="slow">
         <p:fade/>
       </p:transition>
@@ -27750,13 +27750,13 @@
   <p:clrMapOvr>
     <a:masterClrMapping/>
   </p:clrMapOvr>
-  <mc:AlternateContent xmlns:mc="http://schemas.openxmlformats.org/markup-compatibility/2006" xmlns:p15="http://schemas.microsoft.com/office/powerpoint/2012/main">
-    <mc:Choice Requires="p15">
+  <mc:AlternateContent xmlns:mc="http://schemas.openxmlformats.org/markup-compatibility/2006">
+    <mc:Choice xmlns:p15="http://schemas.microsoft.com/office/powerpoint/2012/main" Requires="p15">
       <p:transition xmlns:p14="http://schemas.microsoft.com/office/powerpoint/2010/main" spd="slow" p14:dur="1250">
-        <p15:prstTrans prst="airplane"/>
+        <p15:prstTrans prst="pageCurlDouble"/>
       </p:transition>
     </mc:Choice>
-    <mc:Fallback xmlns="">
+    <mc:Fallback>
       <p:transition spd="slow">
         <p:fade/>
       </p:transition>
@@ -27843,38 +27843,34 @@
               <a:t>Prima</a:t>
             </a:r>
             <a:r>
+              <a:rPr lang="lv-LV" dirty="0"/>
+              <a:t> algoritms</a:t>
+            </a:r>
+            <a:r>
               <a:rPr lang="en-US" dirty="0"/>
               <a:t> – </a:t>
             </a:r>
             <a:r>
               <a:rPr lang="lv-LV" dirty="0"/>
-              <a:t>lēns, bet ģenerē sarežģītākus labirintus</a:t>
+              <a:t>lēnāks nekā RDFS, bet ģenerē sarežģītākus labirintus</a:t>
             </a:r>
           </a:p>
           <a:p>
             <a:r>
               <a:rPr lang="lv-LV" dirty="0"/>
-              <a:t>A* ir visoptimālākais algoritms, kuru bieži izmanto ceļa atrašanai, jo tas ir diezgan ātrs un </a:t>
-            </a:r>
-            <a:r>
-              <a:rPr lang="lv-LV" dirty="0" err="1"/>
-              <a:t>dōd</a:t>
-            </a:r>
-            <a:r>
-              <a:rPr lang="lv-LV" dirty="0"/>
-              <a:t> relatīvi īso ceļu.</a:t>
+              <a:t>A* ir visoptimālākais algoritms, kuru bieži izmanto ceļa atrašanai, jo tas ir diezgan ātrs un dod relatīvi īso ceļu.</a:t>
             </a:r>
           </a:p>
           <a:p>
             <a:r>
               <a:rPr lang="lv-LV" dirty="0"/>
-              <a:t>DFS – ātrs, bet stulbs</a:t>
+              <a:t>DFS – ātrs, bet atrod garu ceļu</a:t>
             </a:r>
           </a:p>
           <a:p>
             <a:r>
               <a:rPr lang="lv-LV" dirty="0"/>
-              <a:t>BFS – lēns, bet īss</a:t>
+              <a:t>BFS – lēns, bet atrod visīsāko ceļu</a:t>
             </a:r>
           </a:p>
           <a:p>
@@ -27892,13 +27888,13 @@
   <p:clrMapOvr>
     <a:masterClrMapping/>
   </p:clrMapOvr>
-  <mc:AlternateContent xmlns:mc="http://schemas.openxmlformats.org/markup-compatibility/2006" xmlns:p15="http://schemas.microsoft.com/office/powerpoint/2012/main">
-    <mc:Choice Requires="p15">
+  <mc:AlternateContent xmlns:mc="http://schemas.openxmlformats.org/markup-compatibility/2006">
+    <mc:Choice xmlns:p15="http://schemas.microsoft.com/office/powerpoint/2012/main" Requires="p15">
       <p:transition xmlns:p14="http://schemas.microsoft.com/office/powerpoint/2010/main" spd="slow" p14:dur="1250">
-        <p15:prstTrans prst="airplane"/>
+        <p15:prstTrans prst="pageCurlDouble"/>
       </p:transition>
     </mc:Choice>
-    <mc:Fallback xmlns="">
+    <mc:Fallback>
       <p:transition spd="slow">
         <p:fade/>
       </p:transition>
@@ -28036,13 +28032,13 @@
   <p:clrMapOvr>
     <a:masterClrMapping/>
   </p:clrMapOvr>
-  <mc:AlternateContent xmlns:mc="http://schemas.openxmlformats.org/markup-compatibility/2006" xmlns:p15="http://schemas.microsoft.com/office/powerpoint/2012/main">
-    <mc:Choice Requires="p15">
+  <mc:AlternateContent xmlns:mc="http://schemas.openxmlformats.org/markup-compatibility/2006">
+    <mc:Choice xmlns:p15="http://schemas.microsoft.com/office/powerpoint/2012/main" Requires="p15">
       <p:transition xmlns:p14="http://schemas.microsoft.com/office/powerpoint/2010/main" spd="slow" p14:dur="1250">
-        <p15:prstTrans prst="airplane"/>
+        <p15:prstTrans prst="pageCurlDouble"/>
       </p:transition>
     </mc:Choice>
-    <mc:Fallback xmlns="">
+    <mc:Fallback>
       <p:transition spd="slow">
         <p:fade/>
       </p:transition>
@@ -28148,13 +28144,13 @@
   <p:clrMapOvr>
     <a:masterClrMapping/>
   </p:clrMapOvr>
-  <mc:AlternateContent xmlns:mc="http://schemas.openxmlformats.org/markup-compatibility/2006" xmlns:p15="http://schemas.microsoft.com/office/powerpoint/2012/main">
-    <mc:Choice Requires="p15">
+  <mc:AlternateContent xmlns:mc="http://schemas.openxmlformats.org/markup-compatibility/2006">
+    <mc:Choice xmlns:p15="http://schemas.microsoft.com/office/powerpoint/2012/main" Requires="p15">
       <p:transition xmlns:p14="http://schemas.microsoft.com/office/powerpoint/2010/main" spd="slow" p14:dur="1250">
-        <p15:prstTrans prst="airplane"/>
+        <p15:prstTrans prst="pageCurlDouble"/>
       </p:transition>
     </mc:Choice>
-    <mc:Fallback xmlns="">
+    <mc:Fallback>
       <p:transition spd="slow">
         <p:fade/>
       </p:transition>
@@ -28317,13 +28313,13 @@
   <p:clrMapOvr>
     <a:masterClrMapping/>
   </p:clrMapOvr>
-  <mc:AlternateContent xmlns:mc="http://schemas.openxmlformats.org/markup-compatibility/2006" xmlns:p15="http://schemas.microsoft.com/office/powerpoint/2012/main">
-    <mc:Choice Requires="p15">
+  <mc:AlternateContent xmlns:mc="http://schemas.openxmlformats.org/markup-compatibility/2006">
+    <mc:Choice xmlns:p15="http://schemas.microsoft.com/office/powerpoint/2012/main" Requires="p15">
       <p:transition xmlns:p14="http://schemas.microsoft.com/office/powerpoint/2010/main" spd="slow" p14:dur="1250">
-        <p15:prstTrans prst="airplane"/>
+        <p15:prstTrans prst="pageCurlDouble"/>
       </p:transition>
     </mc:Choice>
-    <mc:Fallback xmlns="">
+    <mc:Fallback>
       <p:transition spd="slow">
         <p:fade/>
       </p:transition>
@@ -28440,7 +28436,7 @@
             </a:r>
             <a:r>
               <a:rPr lang="lv-LV" dirty="0"/>
-              <a:t> labirinta ģenerācijas algoritmiem būs apmēram vienāds izpildes laiks. Savukārt ceļa meklēšanas algoritmiem: DFS būs visātrākais, BFS atradis visoptimālākos ceļus, bet A* piemīt labākās DFS un BFS īpašības. </a:t>
+              <a:t> labirinta ģenerācijas algoritmiem būs apmēram vienāds izpildes laiks. Savukārt ceļa meklēšanas algoritmiem: DFS būs visātrākais, BFS atradīs visoptimālākos ceļus, bet A* piemīt labākās DFS un BFS īpašības. </a:t>
             </a:r>
             <a:endParaRPr lang="en-GB" dirty="0"/>
           </a:p>
@@ -28456,13 +28452,13 @@
   <p:clrMapOvr>
     <a:masterClrMapping/>
   </p:clrMapOvr>
-  <mc:AlternateContent xmlns:mc="http://schemas.openxmlformats.org/markup-compatibility/2006" xmlns:p15="http://schemas.microsoft.com/office/powerpoint/2012/main">
-    <mc:Choice Requires="p15">
+  <mc:AlternateContent xmlns:mc="http://schemas.openxmlformats.org/markup-compatibility/2006">
+    <mc:Choice xmlns:p15="http://schemas.microsoft.com/office/powerpoint/2012/main" Requires="p15">
       <p:transition xmlns:p14="http://schemas.microsoft.com/office/powerpoint/2010/main" spd="slow" p14:dur="1250">
-        <p15:prstTrans prst="airplane"/>
+        <p15:prstTrans prst="pageCurlDouble"/>
       </p:transition>
     </mc:Choice>
-    <mc:Fallback xmlns="">
+    <mc:Fallback>
       <p:transition spd="slow">
         <p:fade/>
       </p:transition>
@@ -28629,13 +28625,13 @@
   <p:clrMapOvr>
     <a:masterClrMapping/>
   </p:clrMapOvr>
-  <mc:AlternateContent xmlns:mc="http://schemas.openxmlformats.org/markup-compatibility/2006" xmlns:p15="http://schemas.microsoft.com/office/powerpoint/2012/main">
-    <mc:Choice Requires="p15">
+  <mc:AlternateContent xmlns:mc="http://schemas.openxmlformats.org/markup-compatibility/2006">
+    <mc:Choice xmlns:p15="http://schemas.microsoft.com/office/powerpoint/2012/main" Requires="p15">
       <p:transition xmlns:p14="http://schemas.microsoft.com/office/powerpoint/2010/main" spd="slow" p14:dur="1250">
-        <p15:prstTrans prst="airplane"/>
+        <p15:prstTrans prst="pageCurlDouble"/>
       </p:transition>
     </mc:Choice>
-    <mc:Fallback xmlns="">
+    <mc:Fallback>
       <p:transition spd="slow">
         <p:fade/>
       </p:transition>
@@ -28797,13 +28793,13 @@
   <p:clrMapOvr>
     <a:masterClrMapping/>
   </p:clrMapOvr>
-  <mc:AlternateContent xmlns:mc="http://schemas.openxmlformats.org/markup-compatibility/2006" xmlns:p15="http://schemas.microsoft.com/office/powerpoint/2012/main">
-    <mc:Choice Requires="p15">
+  <mc:AlternateContent xmlns:mc="http://schemas.openxmlformats.org/markup-compatibility/2006">
+    <mc:Choice xmlns:p15="http://schemas.microsoft.com/office/powerpoint/2012/main" Requires="p15">
       <p:transition xmlns:p14="http://schemas.microsoft.com/office/powerpoint/2010/main" spd="slow" p14:dur="1250">
-        <p15:prstTrans prst="airplane"/>
+        <p15:prstTrans prst="pageCurlDouble"/>
       </p:transition>
     </mc:Choice>
-    <mc:Fallback xmlns="">
+    <mc:Fallback>
       <p:transition spd="slow">
         <p:fade/>
       </p:transition>
@@ -28978,13 +28974,13 @@
   <p:clrMapOvr>
     <a:masterClrMapping/>
   </p:clrMapOvr>
-  <mc:AlternateContent xmlns:mc="http://schemas.openxmlformats.org/markup-compatibility/2006" xmlns:p15="http://schemas.microsoft.com/office/powerpoint/2012/main">
-    <mc:Choice Requires="p15">
+  <mc:AlternateContent xmlns:mc="http://schemas.openxmlformats.org/markup-compatibility/2006">
+    <mc:Choice xmlns:p15="http://schemas.microsoft.com/office/powerpoint/2012/main" Requires="p15">
       <p:transition xmlns:p14="http://schemas.microsoft.com/office/powerpoint/2010/main" spd="slow" p14:dur="1250">
-        <p15:prstTrans prst="airplane"/>
+        <p15:prstTrans prst="pageCurlDouble"/>
       </p:transition>
     </mc:Choice>
-    <mc:Fallback xmlns="">
+    <mc:Fallback>
       <p:transition spd="slow">
         <p:fade/>
       </p:transition>
@@ -29199,13 +29195,13 @@
   <p:clrMapOvr>
     <a:masterClrMapping/>
   </p:clrMapOvr>
-  <mc:AlternateContent xmlns:mc="http://schemas.openxmlformats.org/markup-compatibility/2006" xmlns:p15="http://schemas.microsoft.com/office/powerpoint/2012/main">
-    <mc:Choice Requires="p15">
+  <mc:AlternateContent xmlns:mc="http://schemas.openxmlformats.org/markup-compatibility/2006">
+    <mc:Choice xmlns:p15="http://schemas.microsoft.com/office/powerpoint/2012/main" Requires="p15">
       <p:transition xmlns:p14="http://schemas.microsoft.com/office/powerpoint/2010/main" spd="slow" p14:dur="1250">
-        <p15:prstTrans prst="airplane"/>
+        <p15:prstTrans prst="pageCurlDouble"/>
       </p:transition>
     </mc:Choice>
-    <mc:Fallback xmlns="">
+    <mc:Fallback>
       <p:transition spd="slow">
         <p:fade/>
       </p:transition>
@@ -29420,13 +29416,13 @@
   <p:clrMapOvr>
     <a:masterClrMapping/>
   </p:clrMapOvr>
-  <mc:AlternateContent xmlns:mc="http://schemas.openxmlformats.org/markup-compatibility/2006" xmlns:p15="http://schemas.microsoft.com/office/powerpoint/2012/main">
-    <mc:Choice Requires="p15">
+  <mc:AlternateContent xmlns:mc="http://schemas.openxmlformats.org/markup-compatibility/2006">
+    <mc:Choice xmlns:p15="http://schemas.microsoft.com/office/powerpoint/2012/main" Requires="p15">
       <p:transition xmlns:p14="http://schemas.microsoft.com/office/powerpoint/2010/main" spd="slow" p14:dur="1250">
-        <p15:prstTrans prst="airplane"/>
+        <p15:prstTrans prst="pageCurlDouble"/>
       </p:transition>
     </mc:Choice>
-    <mc:Fallback xmlns="">
+    <mc:Fallback>
       <p:transition spd="slow">
         <p:fade/>
       </p:transition>
@@ -29635,13 +29631,13 @@
   <p:clrMapOvr>
     <a:masterClrMapping/>
   </p:clrMapOvr>
-  <mc:AlternateContent xmlns:mc="http://schemas.openxmlformats.org/markup-compatibility/2006" xmlns:p15="http://schemas.microsoft.com/office/powerpoint/2012/main">
-    <mc:Choice Requires="p15">
+  <mc:AlternateContent xmlns:mc="http://schemas.openxmlformats.org/markup-compatibility/2006">
+    <mc:Choice xmlns:p15="http://schemas.microsoft.com/office/powerpoint/2012/main" Requires="p15">
       <p:transition xmlns:p14="http://schemas.microsoft.com/office/powerpoint/2010/main" spd="slow" p14:dur="1250">
-        <p15:prstTrans prst="airplane"/>
+        <p15:prstTrans prst="pageCurlDouble"/>
       </p:transition>
     </mc:Choice>
-    <mc:Fallback xmlns="">
+    <mc:Fallback>
       <p:transition spd="slow">
         <p:fade/>
       </p:transition>
@@ -40895,13 +40891,13 @@
   <p:clrMapOvr>
     <a:masterClrMapping/>
   </p:clrMapOvr>
-  <mc:AlternateContent xmlns:mc="http://schemas.openxmlformats.org/markup-compatibility/2006" xmlns:p15="http://schemas.microsoft.com/office/powerpoint/2012/main">
-    <mc:Choice Requires="p15">
+  <mc:AlternateContent xmlns:mc="http://schemas.openxmlformats.org/markup-compatibility/2006">
+    <mc:Choice xmlns:p15="http://schemas.microsoft.com/office/powerpoint/2012/main" Requires="p15">
       <p:transition xmlns:p14="http://schemas.microsoft.com/office/powerpoint/2010/main" spd="slow" p14:dur="1250">
-        <p15:prstTrans prst="airplane"/>
+        <p15:prstTrans prst="pageCurlDouble"/>
       </p:transition>
     </mc:Choice>
-    <mc:Fallback xmlns="">
+    <mc:Fallback>
       <p:transition spd="slow">
         <p:fade/>
       </p:transition>

</xml_diff>